<commit_message>
Minor tweaks to notes
</commit_message>
<xml_diff>
--- a/Secure Systems - CONDG 2017.pptx
+++ b/Secure Systems - CONDG 2017.pptx
@@ -300,7 +300,7 @@
           <a:p>
             <a:fld id="{C54A4886-B4AF-42F7-97BE-95CDF82A73E3}" type="datetimeFigureOut">
               <a:rPr lang="en-US" smtClean="0"/>
-              <a:t>3/20/2017</a:t>
+              <a:t>3/22/2017</a:t>
             </a:fld>
             <a:endParaRPr lang="en-US"/>
           </a:p>
@@ -612,34 +612,42 @@
           <a:bodyPr/>
           <a:lstStyle/>
           <a:p>
-            <a:pPr marL="0" marR="0" lvl="0" indent="0" algn="l" defTabSz="914400" rtl="0" eaLnBrk="1" fontAlgn="auto" latinLnBrk="0" hangingPunct="1">
-              <a:lnSpc>
-                <a:spcPct val="100000"/>
-              </a:lnSpc>
-              <a:spcBef>
-                <a:spcPts val="0"/>
-              </a:spcBef>
-              <a:spcAft>
-                <a:spcPts val="0"/>
-              </a:spcAft>
-              <a:buClrTx/>
-              <a:buSzTx/>
-              <a:buFontTx/>
-              <a:buNone/>
-              <a:tabLst/>
-              <a:defRPr/>
-            </a:pPr>
-            <a:r>
-              <a:rPr lang="en-US" sz="1200" kern="1200" dirty="0" smtClean="0">
-                <a:solidFill>
-                  <a:schemeClr val="tx1"/>
-                </a:solidFill>
-                <a:effectLst/>
-                <a:latin typeface="+mn-lt"/>
-                <a:ea typeface="+mn-ea"/>
-                <a:cs typeface="+mn-cs"/>
-              </a:rPr>
-              <a:t>Hello, and welcome to “Don’t Write Secure Code”. I’m Seth Petry-Johnson, and unlike some of the other speakers in this track, I am not a security professional. I’m just a normal programmer, although I do have a security related confession to make.</a:t>
+            <a:r>
+              <a:rPr lang="en-US" sz="1200" kern="1200" dirty="0" smtClean="0">
+                <a:solidFill>
+                  <a:schemeClr val="tx1"/>
+                </a:solidFill>
+                <a:effectLst/>
+                <a:latin typeface="+mn-lt"/>
+                <a:ea typeface="+mn-ea"/>
+                <a:cs typeface="+mn-cs"/>
+              </a:rPr>
+              <a:t>Hello, and welcome to “Don’t Write Secure Code”. I’m Seth Petry-Johnson and I’m going to talk to you today about security. </a:t>
+            </a:r>
+          </a:p>
+          <a:p>
+            <a:endParaRPr lang="en-US" sz="1200" kern="1200" dirty="0" smtClean="0">
+              <a:solidFill>
+                <a:schemeClr val="tx1"/>
+              </a:solidFill>
+              <a:effectLst/>
+              <a:latin typeface="+mn-lt"/>
+              <a:ea typeface="+mn-ea"/>
+              <a:cs typeface="+mn-cs"/>
+            </a:endParaRPr>
+          </a:p>
+          <a:p>
+            <a:r>
+              <a:rPr lang="en-US" sz="1200" kern="1200" dirty="0" smtClean="0">
+                <a:solidFill>
+                  <a:schemeClr val="tx1"/>
+                </a:solidFill>
+                <a:effectLst/>
+                <a:latin typeface="+mn-lt"/>
+                <a:ea typeface="+mn-ea"/>
+                <a:cs typeface="+mn-cs"/>
+              </a:rPr>
+              <a:t>I’m just a normal programmer-slash-architect, I’m not a security professional. And in fact, I have a security related confession to make.</a:t>
             </a:r>
           </a:p>
           <a:p>
@@ -5186,19 +5194,7 @@
                 <a:ea typeface="+mn-ea"/>
                 <a:cs typeface="+mn-cs"/>
               </a:rPr>
-              <a:t>the developer has to do is derive their controller from the correct base class. As long as they do that, everything is handled automatically</a:t>
-            </a:r>
-            <a:r>
-              <a:rPr lang="en-US" sz="1200" kern="1200" dirty="0" smtClean="0">
-                <a:solidFill>
-                  <a:schemeClr val="tx1"/>
-                </a:solidFill>
-                <a:effectLst/>
-                <a:latin typeface="+mn-lt"/>
-                <a:ea typeface="+mn-ea"/>
-                <a:cs typeface="+mn-cs"/>
-              </a:rPr>
-              <a:t>.</a:t>
+              <a:t>the developer has to do is derive their controller from the correct base class. As long as they do that, everything is handled automatically.</a:t>
             </a:r>
           </a:p>
           <a:p>
@@ -8703,7 +8699,31 @@
                 <a:ea typeface="+mn-ea"/>
                 <a:cs typeface="+mn-cs"/>
               </a:rPr>
-              <a:t>The function assumes that the current user ID has been added to the session context. It accepts as input the user ID associated with an Order. </a:t>
+              <a:t>The function </a:t>
+            </a:r>
+            <a:r>
+              <a:rPr lang="en-US" sz="1200" kern="1200" dirty="0" smtClean="0">
+                <a:solidFill>
+                  <a:schemeClr val="tx1"/>
+                </a:solidFill>
+                <a:effectLst/>
+                <a:latin typeface="+mn-lt"/>
+                <a:ea typeface="+mn-ea"/>
+                <a:cs typeface="+mn-cs"/>
+              </a:rPr>
+              <a:t>accepts </a:t>
+            </a:r>
+            <a:r>
+              <a:rPr lang="en-US" sz="1200" kern="1200" dirty="0" smtClean="0">
+                <a:solidFill>
+                  <a:schemeClr val="tx1"/>
+                </a:solidFill>
+                <a:effectLst/>
+                <a:latin typeface="+mn-lt"/>
+                <a:ea typeface="+mn-ea"/>
+                <a:cs typeface="+mn-cs"/>
+              </a:rPr>
+              <a:t>as input the user ID associated with an Order. </a:t>
             </a:r>
           </a:p>
           <a:p>
@@ -9103,19 +9123,7 @@
                 <a:ea typeface="+mn-ea"/>
                 <a:cs typeface="+mn-cs"/>
               </a:rPr>
-              <a:t>In </a:t>
-            </a:r>
-            <a:r>
-              <a:rPr lang="en-US" sz="1200" kern="1200" dirty="0" smtClean="0">
-                <a:solidFill>
-                  <a:schemeClr val="tx1"/>
-                </a:solidFill>
-                <a:effectLst/>
-                <a:latin typeface="+mn-lt"/>
-                <a:ea typeface="+mn-ea"/>
-                <a:cs typeface="+mn-cs"/>
-              </a:rPr>
-              <a:t>Entity Framework, for example, we can create a class that implements the </a:t>
+              <a:t>In Entity Framework, for example, we can create a class that implements the </a:t>
             </a:r>
             <a:r>
               <a:rPr lang="en-US" sz="1200" kern="1200" dirty="0" err="1" smtClean="0">
@@ -10925,7 +10933,79 @@
                 <a:ea typeface="+mn-ea"/>
                 <a:cs typeface="+mn-cs"/>
               </a:rPr>
-              <a:t>The difference is that, using this custom API key approach, that attribute needs to handle both authentication AND authorization. The way we do that is to ensure that every API argument class derives from a base class called </a:t>
+              <a:t>The </a:t>
+            </a:r>
+            <a:r>
+              <a:rPr lang="en-US" sz="1200" kern="1200" dirty="0" smtClean="0">
+                <a:solidFill>
+                  <a:schemeClr val="tx1"/>
+                </a:solidFill>
+                <a:effectLst/>
+                <a:latin typeface="+mn-lt"/>
+                <a:ea typeface="+mn-ea"/>
+                <a:cs typeface="+mn-cs"/>
+              </a:rPr>
+              <a:t>way we do </a:t>
+            </a:r>
+            <a:r>
+              <a:rPr lang="en-US" sz="1200" kern="1200" dirty="0" smtClean="0">
+                <a:solidFill>
+                  <a:schemeClr val="tx1"/>
+                </a:solidFill>
+                <a:effectLst/>
+                <a:latin typeface="+mn-lt"/>
+                <a:ea typeface="+mn-ea"/>
+                <a:cs typeface="+mn-cs"/>
+              </a:rPr>
+              <a:t>this with </a:t>
+            </a:r>
+            <a:r>
+              <a:rPr lang="en-US" sz="1200" kern="1200" dirty="0" err="1" smtClean="0">
+                <a:solidFill>
+                  <a:schemeClr val="tx1"/>
+                </a:solidFill>
+                <a:effectLst/>
+                <a:latin typeface="+mn-lt"/>
+                <a:ea typeface="+mn-ea"/>
+                <a:cs typeface="+mn-cs"/>
+              </a:rPr>
+              <a:t>WebAPI</a:t>
+            </a:r>
+            <a:r>
+              <a:rPr lang="en-US" sz="1200" kern="1200" dirty="0" smtClean="0">
+                <a:solidFill>
+                  <a:schemeClr val="tx1"/>
+                </a:solidFill>
+                <a:effectLst/>
+                <a:latin typeface="+mn-lt"/>
+                <a:ea typeface="+mn-ea"/>
+                <a:cs typeface="+mn-cs"/>
+              </a:rPr>
+              <a:t> </a:t>
+            </a:r>
+            <a:r>
+              <a:rPr lang="en-US" sz="1200" kern="1200" smtClean="0">
+                <a:solidFill>
+                  <a:schemeClr val="tx1"/>
+                </a:solidFill>
+                <a:effectLst/>
+                <a:latin typeface="+mn-lt"/>
+                <a:ea typeface="+mn-ea"/>
+                <a:cs typeface="+mn-cs"/>
+              </a:rPr>
+              <a:t>is to is </a:t>
+            </a:r>
+            <a:r>
+              <a:rPr lang="en-US" sz="1200" kern="1200" dirty="0" smtClean="0">
+                <a:solidFill>
+                  <a:schemeClr val="tx1"/>
+                </a:solidFill>
+                <a:effectLst/>
+                <a:latin typeface="+mn-lt"/>
+                <a:ea typeface="+mn-ea"/>
+                <a:cs typeface="+mn-cs"/>
+              </a:rPr>
+              <a:t>to ensure that every API argument class derives from a base class called </a:t>
             </a:r>
             <a:r>
               <a:rPr lang="en-US" sz="1200" kern="1200" dirty="0" err="1" smtClean="0">
@@ -15544,41 +15624,28 @@
           </a:p>
           <a:p>
             <a:r>
-              <a:rPr lang="en-US" sz="1200" kern="1200" dirty="0" smtClean="0">
-                <a:solidFill>
-                  <a:schemeClr val="tx1"/>
-                </a:solidFill>
-                <a:effectLst/>
-                <a:latin typeface="+mn-lt"/>
-                <a:ea typeface="+mn-ea"/>
-                <a:cs typeface="+mn-cs"/>
-              </a:rPr>
-              <a:t>Code samples in this talk are in .NET and JS, because that’s what I’m familiar with. However, many of the techniques I’ll show you have parallels in other languages and platforms as well, so the general ideas should be portable even if the specific code samples are not.</a:t>
-            </a:r>
-          </a:p>
-          <a:p>
-            <a:endParaRPr lang="en-US" sz="1200" kern="1200" dirty="0" smtClean="0">
-              <a:solidFill>
-                <a:schemeClr val="tx1"/>
-              </a:solidFill>
-              <a:effectLst/>
-              <a:latin typeface="+mn-lt"/>
-              <a:ea typeface="+mn-ea"/>
-              <a:cs typeface="+mn-cs"/>
-            </a:endParaRPr>
-          </a:p>
-          <a:p>
-            <a:r>
-              <a:rPr lang="en-US" sz="1200" kern="1200" dirty="0" smtClean="0">
-                <a:solidFill>
-                  <a:schemeClr val="tx1"/>
-                </a:solidFill>
-                <a:effectLst/>
-                <a:latin typeface="+mn-lt"/>
-                <a:ea typeface="+mn-ea"/>
-                <a:cs typeface="+mn-cs"/>
-              </a:rPr>
-              <a:t>Also, before we go any farther, I tend to speak pretty fast,</a:t>
+              <a:rPr lang="en-US" sz="1200" kern="1200" smtClean="0">
+                <a:solidFill>
+                  <a:schemeClr val="tx1"/>
+                </a:solidFill>
+                <a:effectLst/>
+                <a:latin typeface="+mn-lt"/>
+                <a:ea typeface="+mn-ea"/>
+                <a:cs typeface="+mn-cs"/>
+              </a:rPr>
+              <a:t>Also</a:t>
+            </a:r>
+            <a:r>
+              <a:rPr lang="en-US" sz="1200" kern="1200" dirty="0" smtClean="0">
+                <a:solidFill>
+                  <a:schemeClr val="tx1"/>
+                </a:solidFill>
+                <a:effectLst/>
+                <a:latin typeface="+mn-lt"/>
+                <a:ea typeface="+mn-ea"/>
+                <a:cs typeface="+mn-cs"/>
+              </a:rPr>
+              <a:t>, before we go any farther, I tend to speak pretty fast,</a:t>
             </a:r>
             <a:r>
               <a:rPr lang="en-US" sz="1200" kern="1200" baseline="0" dirty="0" smtClean="0">
@@ -16515,7 +16582,7 @@
           <a:p>
             <a:fld id="{75AA6396-395E-4ADA-8EE5-F328BC863A04}" type="datetimeFigureOut">
               <a:rPr lang="en-US" smtClean="0"/>
-              <a:t>3/20/2017</a:t>
+              <a:t>3/22/2017</a:t>
             </a:fld>
             <a:endParaRPr lang="en-US"/>
           </a:p>
@@ -16692,7 +16759,7 @@
           <a:p>
             <a:fld id="{75AA6396-395E-4ADA-8EE5-F328BC863A04}" type="datetimeFigureOut">
               <a:rPr lang="en-US" smtClean="0"/>
-              <a:t>3/20/2017</a:t>
+              <a:t>3/22/2017</a:t>
             </a:fld>
             <a:endParaRPr lang="en-US"/>
           </a:p>
@@ -16872,7 +16939,7 @@
           <a:p>
             <a:fld id="{75AA6396-395E-4ADA-8EE5-F328BC863A04}" type="datetimeFigureOut">
               <a:rPr lang="en-US" smtClean="0"/>
-              <a:t>3/20/2017</a:t>
+              <a:t>3/22/2017</a:t>
             </a:fld>
             <a:endParaRPr lang="en-US"/>
           </a:p>
@@ -17092,7 +17159,7 @@
           <a:p>
             <a:fld id="{75AA6396-395E-4ADA-8EE5-F328BC863A04}" type="datetimeFigureOut">
               <a:rPr lang="en-US" smtClean="0"/>
-              <a:t>3/20/2017</a:t>
+              <a:t>3/22/2017</a:t>
             </a:fld>
             <a:endParaRPr lang="en-US"/>
           </a:p>
@@ -17345,7 +17412,7 @@
           <a:p>
             <a:fld id="{75AA6396-395E-4ADA-8EE5-F328BC863A04}" type="datetimeFigureOut">
               <a:rPr lang="en-US" smtClean="0"/>
-              <a:t>3/20/2017</a:t>
+              <a:t>3/22/2017</a:t>
             </a:fld>
             <a:endParaRPr lang="en-US"/>
           </a:p>
@@ -17584,7 +17651,7 @@
           <a:p>
             <a:fld id="{75AA6396-395E-4ADA-8EE5-F328BC863A04}" type="datetimeFigureOut">
               <a:rPr lang="en-US" smtClean="0"/>
-              <a:t>3/20/2017</a:t>
+              <a:t>3/22/2017</a:t>
             </a:fld>
             <a:endParaRPr lang="en-US"/>
           </a:p>
@@ -17958,7 +18025,7 @@
           <a:p>
             <a:fld id="{75AA6396-395E-4ADA-8EE5-F328BC863A04}" type="datetimeFigureOut">
               <a:rPr lang="en-US" smtClean="0"/>
-              <a:t>3/20/2017</a:t>
+              <a:t>3/22/2017</a:t>
             </a:fld>
             <a:endParaRPr lang="en-US"/>
           </a:p>
@@ -18076,7 +18143,7 @@
           <a:p>
             <a:fld id="{75AA6396-395E-4ADA-8EE5-F328BC863A04}" type="datetimeFigureOut">
               <a:rPr lang="en-US" smtClean="0"/>
-              <a:t>3/20/2017</a:t>
+              <a:t>3/22/2017</a:t>
             </a:fld>
             <a:endParaRPr lang="en-US"/>
           </a:p>
@@ -18171,7 +18238,7 @@
           <a:p>
             <a:fld id="{75AA6396-395E-4ADA-8EE5-F328BC863A04}" type="datetimeFigureOut">
               <a:rPr lang="en-US" smtClean="0"/>
-              <a:t>3/20/2017</a:t>
+              <a:t>3/22/2017</a:t>
             </a:fld>
             <a:endParaRPr lang="en-US"/>
           </a:p>
@@ -18448,7 +18515,7 @@
           <a:p>
             <a:fld id="{75AA6396-395E-4ADA-8EE5-F328BC863A04}" type="datetimeFigureOut">
               <a:rPr lang="en-US" smtClean="0"/>
-              <a:t>3/20/2017</a:t>
+              <a:t>3/22/2017</a:t>
             </a:fld>
             <a:endParaRPr lang="en-US"/>
           </a:p>
@@ -18701,7 +18768,7 @@
           <a:p>
             <a:fld id="{75AA6396-395E-4ADA-8EE5-F328BC863A04}" type="datetimeFigureOut">
               <a:rPr lang="en-US" smtClean="0"/>
-              <a:t>3/20/2017</a:t>
+              <a:t>3/22/2017</a:t>
             </a:fld>
             <a:endParaRPr lang="en-US"/>
           </a:p>
@@ -18914,7 +18981,7 @@
           <a:p>
             <a:fld id="{75AA6396-395E-4ADA-8EE5-F328BC863A04}" type="datetimeFigureOut">
               <a:rPr lang="en-US" smtClean="0"/>
-              <a:t>3/20/2017</a:t>
+              <a:t>3/22/2017</a:t>
             </a:fld>
             <a:endParaRPr lang="en-US"/>
           </a:p>

</xml_diff>